<commit_message>
-added the while instruction -minor modification to the slide01, V3, W3
</commit_message>
<xml_diff>
--- a/semaine3/CO12AL-W3-VIDEO03-SLIDE01.pptx
+++ b/semaine3/CO12AL-W3-VIDEO03-SLIDE01.pptx
@@ -585,7 +585,7 @@
           </a:ln>
           <a:extLst>
             <a:ext uri="{909E8E84-426E-40dd-AFC4-6F175D3DCCD1}">
-              <a14:hiddenFill xmlns:a14="http://schemas.microsoft.com/office/drawing/2010/main" xmlns="">
+              <a14:hiddenFill xmlns="" xmlns:a14="http://schemas.microsoft.com/office/drawing/2010/main">
                 <a:solidFill>
                   <a:srgbClr val="FFFFFF"/>
                 </a:solidFill>
@@ -1132,6 +1132,13 @@
               <a:rPr lang="fr-FR" baseline="0" dirty="0" smtClean="0"/>
               <a:t>-in. </a:t>
             </a:r>
+            <a:endParaRPr lang="fr-FR" baseline="0" dirty="0" smtClean="0"/>
+          </a:p>
+          <a:p>
+            <a:r>
+              <a:rPr lang="fr-FR" baseline="0" dirty="0" smtClean="0"/>
+              <a:t>-soit le résultat d’un opérateur de test booléen</a:t>
+            </a:r>
             <a:endParaRPr lang="fr-FR" dirty="0"/>
           </a:p>
         </p:txBody>
@@ -4189,14 +4196,14 @@
           </a:ln>
           <a:extLst>
             <a:ext uri="{909E8E84-426E-40dd-AFC4-6F175D3DCCD1}">
-              <a14:hiddenFill xmlns:a14="http://schemas.microsoft.com/office/drawing/2010/main" xmlns="">
+              <a14:hiddenFill xmlns="" xmlns:a14="http://schemas.microsoft.com/office/drawing/2010/main">
                 <a:solidFill>
                   <a:srgbClr val="FFFFFF"/>
                 </a:solidFill>
               </a14:hiddenFill>
             </a:ext>
             <a:ext uri="{91240B29-F687-4f45-9708-019B960494DF}">
-              <a14:hiddenLine xmlns:a14="http://schemas.microsoft.com/office/drawing/2010/main" xmlns="" w="9525">
+              <a14:hiddenLine xmlns="" xmlns:a14="http://schemas.microsoft.com/office/drawing/2010/main" w="9525">
                 <a:solidFill>
                   <a:srgbClr val="000000"/>
                 </a:solidFill>
@@ -4247,14 +4254,14 @@
           </a:ln>
           <a:extLst>
             <a:ext uri="{909E8E84-426E-40dd-AFC4-6F175D3DCCD1}">
-              <a14:hiddenFill xmlns:a14="http://schemas.microsoft.com/office/drawing/2010/main" xmlns="">
+              <a14:hiddenFill xmlns="" xmlns:a14="http://schemas.microsoft.com/office/drawing/2010/main">
                 <a:solidFill>
                   <a:srgbClr val="FFFFFF"/>
                 </a:solidFill>
               </a14:hiddenFill>
             </a:ext>
             <a:ext uri="{91240B29-F687-4f45-9708-019B960494DF}">
-              <a14:hiddenLine xmlns:a14="http://schemas.microsoft.com/office/drawing/2010/main" xmlns="" w="9525">
+              <a14:hiddenLine xmlns="" xmlns:a14="http://schemas.microsoft.com/office/drawing/2010/main" w="9525">
                 <a:solidFill>
                   <a:srgbClr val="000000"/>
                 </a:solidFill>
@@ -5766,7 +5773,24 @@
             <a:pPr lvl="2"/>
             <a:r>
               <a:rPr lang="fr-FR" dirty="0" smtClean="0"/>
-              <a:t>Tout le reste</a:t>
+              <a:t>Tout le </a:t>
+            </a:r>
+            <a:r>
+              <a:rPr lang="fr-FR" dirty="0" smtClean="0"/>
+              <a:t>reste</a:t>
+            </a:r>
+          </a:p>
+          <a:p>
+            <a:pPr marL="0" indent="0">
+              <a:buNone/>
+            </a:pPr>
+            <a:r>
+              <a:rPr lang="fr-FR" dirty="0"/>
+              <a:t>o</a:t>
+            </a:r>
+            <a:r>
+              <a:rPr lang="fr-FR" dirty="0" smtClean="0"/>
+              <a:t>pérateur de test booléen : and, or, not</a:t>
             </a:r>
             <a:endParaRPr lang="fr-FR" dirty="0"/>
           </a:p>
@@ -6313,6 +6337,67 @@
                                           <p:spTgt spid="3">
                                             <p:txEl>
                                               <p:pRg st="8" end="8"/>
+                                            </p:txEl>
+                                          </p:spTgt>
+                                        </p:tgtEl>
+                                      </p:cBhvr>
+                                    </p:animEffect>
+                                  </p:childTnLst>
+                                </p:cTn>
+                              </p:par>
+                            </p:childTnLst>
+                          </p:cTn>
+                        </p:par>
+                      </p:childTnLst>
+                    </p:cTn>
+                  </p:par>
+                  <p:par>
+                    <p:cTn id="47" fill="hold">
+                      <p:stCondLst>
+                        <p:cond delay="indefinite"/>
+                      </p:stCondLst>
+                      <p:childTnLst>
+                        <p:par>
+                          <p:cTn id="48" fill="hold">
+                            <p:stCondLst>
+                              <p:cond delay="0"/>
+                            </p:stCondLst>
+                            <p:childTnLst>
+                              <p:par>
+                                <p:cTn id="49" presetID="10" presetClass="entr" presetSubtype="0" fill="hold" nodeType="clickEffect">
+                                  <p:stCondLst>
+                                    <p:cond delay="0"/>
+                                  </p:stCondLst>
+                                  <p:childTnLst>
+                                    <p:set>
+                                      <p:cBhvr>
+                                        <p:cTn id="50" dur="1" fill="hold">
+                                          <p:stCondLst>
+                                            <p:cond delay="0"/>
+                                          </p:stCondLst>
+                                        </p:cTn>
+                                        <p:tgtEl>
+                                          <p:spTgt spid="3">
+                                            <p:txEl>
+                                              <p:pRg st="9" end="9"/>
+                                            </p:txEl>
+                                          </p:spTgt>
+                                        </p:tgtEl>
+                                        <p:attrNameLst>
+                                          <p:attrName>style.visibility</p:attrName>
+                                        </p:attrNameLst>
+                                      </p:cBhvr>
+                                      <p:to>
+                                        <p:strVal val="visible"/>
+                                      </p:to>
+                                    </p:set>
+                                    <p:animEffect transition="in" filter="fade">
+                                      <p:cBhvr>
+                                        <p:cTn id="51" dur="500"/>
+                                        <p:tgtEl>
+                                          <p:spTgt spid="3">
+                                            <p:txEl>
+                                              <p:pRg st="9" end="9"/>
                                             </p:txEl>
                                           </p:spTgt>
                                         </p:tgtEl>

</xml_diff>

<commit_message>
pas mal de commentaires sur le pptx qui illustre if .. elif ... else ...
</commit_message>
<xml_diff>
--- a/semaine3/CO12AL-W3-VIDEO03-SLIDE01.pptx
+++ b/semaine3/CO12AL-W3-VIDEO03-SLIDE01.pptx
@@ -159,7 +159,7 @@
       </p14:sectionLst>
     </p:ext>
     <p:ext uri="{EFAFB233-063F-42B5-8137-9DF3F51BA10A}">
-      <p15:sldGuideLst xmlns:p15="http://schemas.microsoft.com/office/powerpoint/2012/main">
+      <p15:sldGuideLst xmlns:p15="http://schemas.microsoft.com/office/powerpoint/2012/main" xmlns="">
         <p15:guide id="1" orient="horz" pos="2160" userDrawn="1">
           <p15:clr>
             <a:srgbClr val="A4A3A4"/>
@@ -410,7 +410,7 @@
               <a:pPr>
                 <a:defRPr/>
               </a:pPr>
-              <a:t>‹N°›</a:t>
+              <a:t>‹#›</a:t>
             </a:fld>
             <a:endParaRPr lang="en-US"/>
           </a:p>
@@ -585,7 +585,7 @@
           </a:ln>
           <a:extLst>
             <a:ext uri="{909E8E84-426E-40dd-AFC4-6F175D3DCCD1}">
-              <a14:hiddenFill xmlns:a14="http://schemas.microsoft.com/office/drawing/2010/main" xmlns="">
+              <a14:hiddenFill xmlns:a14="http://schemas.microsoft.com/office/drawing/2010/main">
                 <a:solidFill>
                   <a:srgbClr val="FFFFFF"/>
                 </a:solidFill>
@@ -770,7 +770,7 @@
               <a:pPr>
                 <a:defRPr/>
               </a:pPr>
-              <a:t>‹N°›</a:t>
+              <a:t>‹#›</a:t>
             </a:fld>
             <a:endParaRPr lang="en-US"/>
           </a:p>
@@ -1124,8 +1124,8 @@
               <a:t>-soit le retour d’une </a:t>
             </a:r>
             <a:r>
-              <a:rPr lang="fr-FR" baseline="0" dirty="0" err="1" smtClean="0"/>
-              <a:t>fontion</a:t>
+              <a:rPr lang="fr-FR" baseline="0" dirty="0" smtClean="0"/>
+              <a:t>fonction</a:t>
             </a:r>
             <a:endParaRPr lang="fr-FR" baseline="0" dirty="0" smtClean="0"/>
           </a:p>
@@ -1146,8 +1146,55 @@
           <a:p>
             <a:r>
               <a:rPr lang="fr-FR" baseline="0" dirty="0" smtClean="0"/>
-              <a:t>-soit le résultat d’un opérateur de test booléen</a:t>
-            </a:r>
+              <a:t>-soit le résultat d’un opérateur de test </a:t>
+            </a:r>
+            <a:r>
+              <a:rPr lang="fr-FR" baseline="0" dirty="0" smtClean="0"/>
+              <a:t>booléen</a:t>
+            </a:r>
+          </a:p>
+          <a:p>
+            <a:endParaRPr lang="fr-FR" baseline="0" dirty="0" smtClean="0"/>
+          </a:p>
+          <a:p>
+            <a:r>
+              <a:rPr lang="fr-FR" baseline="0" dirty="0" smtClean="0"/>
+              <a:t>XXX: je ne suis pas d</a:t>
+            </a:r>
+            <a:r>
+              <a:rPr lang="fr-FR" baseline="0" dirty="0" smtClean="0"/>
+              <a:t>’accord avec cette façon de présenter:</a:t>
+            </a:r>
+          </a:p>
+          <a:p>
+            <a:r>
+              <a:rPr lang="fr-FR" dirty="0" smtClean="0"/>
+              <a:t>Le résultat</a:t>
+            </a:r>
+            <a:r>
+              <a:rPr lang="fr-FR" baseline="0" dirty="0" smtClean="0"/>
+              <a:t> d’un test retourne toujours soit </a:t>
+            </a:r>
+            <a:r>
+              <a:rPr lang="fr-FR" baseline="0" dirty="0" err="1" smtClean="0"/>
+              <a:t>True</a:t>
+            </a:r>
+            <a:r>
+              <a:rPr lang="fr-FR" baseline="0" dirty="0" smtClean="0"/>
+              <a:t> soit False</a:t>
+            </a:r>
+          </a:p>
+          <a:p>
+            <a:r>
+              <a:rPr lang="fr-FR" baseline="0" dirty="0" smtClean="0"/>
+              <a:t>Ceci sous-entend que je ne peux faire des tests qu</a:t>
+            </a:r>
+            <a:r>
+              <a:rPr lang="fr-FR" baseline="0" dirty="0" smtClean="0"/>
+              <a:t>’avec une valeur booléenne, alors que ce n’est pas le cas…</a:t>
+            </a:r>
+          </a:p>
+          <a:p>
             <a:endParaRPr lang="fr-FR" dirty="0"/>
           </a:p>
         </p:txBody>
@@ -1245,11 +1292,23 @@
           <a:p>
             <a:r>
               <a:rPr lang="fr-FR" dirty="0" smtClean="0"/>
-              <a:t>note &gt; 12 n’est jamais</a:t>
+              <a:t>note </a:t>
+            </a:r>
+            <a:r>
+              <a:rPr lang="fr-FR" dirty="0" smtClean="0"/>
+              <a:t>&gt; 12 n’est </a:t>
+            </a:r>
+            <a:r>
+              <a:rPr lang="fr-FR" dirty="0" smtClean="0"/>
+              <a:t>jamais</a:t>
             </a:r>
             <a:r>
               <a:rPr lang="fr-FR" baseline="0" dirty="0" smtClean="0"/>
-              <a:t> évalué puisque note &gt; 10 est toujours </a:t>
+              <a:t> </a:t>
+            </a:r>
+            <a:r>
+              <a:rPr lang="fr-FR" baseline="0" dirty="0" smtClean="0"/>
+              <a:t>évalué puisque note &gt; 10 est toujours </a:t>
             </a:r>
             <a:r>
               <a:rPr lang="fr-FR" baseline="0" dirty="0" err="1" smtClean="0"/>
@@ -1257,9 +1316,199 @@
             </a:r>
             <a:r>
               <a:rPr lang="fr-FR" baseline="0" dirty="0" smtClean="0"/>
-              <a:t> si note &gt; 12</a:t>
-            </a:r>
-            <a:endParaRPr lang="fr-FR" dirty="0" smtClean="0"/>
+              <a:t> si note &gt; </a:t>
+            </a:r>
+            <a:r>
+              <a:rPr lang="fr-FR" baseline="0" dirty="0" smtClean="0"/>
+              <a:t>12</a:t>
+            </a:r>
+          </a:p>
+          <a:p>
+            <a:endParaRPr lang="fr-FR" baseline="0" dirty="0" smtClean="0"/>
+          </a:p>
+          <a:p>
+            <a:r>
+              <a:rPr lang="fr-FR" baseline="0" dirty="0" smtClean="0"/>
+              <a:t>XXX: je trouve que pour un tout premier exemple de if (en tous cas cette semaine) cet exemple est </a:t>
+            </a:r>
+            <a:r>
+              <a:rPr lang="fr-FR" baseline="0" dirty="0" err="1" smtClean="0"/>
+              <a:t>confusant</a:t>
+            </a:r>
+            <a:endParaRPr lang="fr-FR" baseline="0" dirty="0" smtClean="0"/>
+          </a:p>
+          <a:p>
+            <a:r>
+              <a:rPr lang="fr-FR" baseline="0" dirty="0" smtClean="0"/>
+              <a:t>Pourquoi ne pas commencer par une </a:t>
+            </a:r>
+            <a:r>
+              <a:rPr lang="fr-FR" baseline="0" dirty="0" err="1" smtClean="0"/>
+              <a:t>premiere</a:t>
+            </a:r>
+            <a:r>
+              <a:rPr lang="fr-FR" baseline="0" dirty="0" smtClean="0"/>
+              <a:t> version </a:t>
+            </a:r>
+            <a:r>
+              <a:rPr lang="fr-FR" baseline="0" dirty="0" smtClean="0"/>
+              <a:t>‘clean’, genre</a:t>
+            </a:r>
+          </a:p>
+          <a:p>
+            <a:r>
+              <a:rPr lang="fr-FR" baseline="0" dirty="0" smtClean="0"/>
+              <a:t>If note &gt;12: …</a:t>
+            </a:r>
+          </a:p>
+          <a:p>
+            <a:r>
+              <a:rPr lang="fr-FR" baseline="0" dirty="0" err="1" smtClean="0"/>
+              <a:t>elif</a:t>
+            </a:r>
+            <a:r>
+              <a:rPr lang="fr-FR" baseline="0" dirty="0" smtClean="0"/>
+              <a:t> note &gt;10: …</a:t>
+            </a:r>
+          </a:p>
+          <a:p>
+            <a:r>
+              <a:rPr lang="fr-FR" baseline="0" dirty="0" err="1" smtClean="0"/>
+              <a:t>else</a:t>
+            </a:r>
+            <a:r>
+              <a:rPr lang="fr-FR" baseline="0" dirty="0" smtClean="0"/>
+              <a:t>: …</a:t>
+            </a:r>
+          </a:p>
+          <a:p>
+            <a:endParaRPr lang="fr-FR" baseline="0" dirty="0" smtClean="0"/>
+          </a:p>
+          <a:p>
+            <a:r>
+              <a:rPr lang="fr-FR" baseline="0" dirty="0" smtClean="0"/>
+              <a:t>Je crois qu’on pourrait de cette </a:t>
+            </a:r>
+            <a:r>
+              <a:rPr lang="fr-FR" baseline="0" dirty="0" err="1" smtClean="0"/>
+              <a:t>facon</a:t>
+            </a:r>
+            <a:r>
+              <a:rPr lang="fr-FR" baseline="0" dirty="0" smtClean="0"/>
+              <a:t> faire l’</a:t>
+            </a:r>
+            <a:r>
+              <a:rPr lang="fr-FR" baseline="0" dirty="0" err="1" smtClean="0"/>
+              <a:t>economie</a:t>
+            </a:r>
+            <a:r>
+              <a:rPr lang="fr-FR" baseline="0" dirty="0" smtClean="0"/>
+              <a:t> des 3 versions du programme, qui IMHO are more </a:t>
+            </a:r>
+            <a:r>
+              <a:rPr lang="fr-FR" baseline="0" dirty="0" err="1" smtClean="0"/>
+              <a:t>confusing</a:t>
+            </a:r>
+            <a:r>
+              <a:rPr lang="fr-FR" baseline="0" dirty="0" smtClean="0"/>
+              <a:t> </a:t>
+            </a:r>
+            <a:r>
+              <a:rPr lang="fr-FR" baseline="0" dirty="0" err="1" smtClean="0"/>
+              <a:t>than</a:t>
+            </a:r>
+            <a:r>
+              <a:rPr lang="fr-FR" baseline="0" dirty="0" smtClean="0"/>
+              <a:t> </a:t>
+            </a:r>
+            <a:r>
+              <a:rPr lang="fr-FR" baseline="0" smtClean="0"/>
+              <a:t>helpful</a:t>
+            </a:r>
+            <a:endParaRPr lang="fr-FR" baseline="0" dirty="0" smtClean="0"/>
+          </a:p>
+          <a:p>
+            <a:endParaRPr lang="fr-FR" baseline="0" dirty="0" smtClean="0"/>
+          </a:p>
+          <a:p>
+            <a:r>
+              <a:rPr lang="fr-FR" baseline="0" dirty="0" smtClean="0"/>
+              <a:t>Et ensuite seulement regarder des variantes comme celle-ci … </a:t>
+            </a:r>
+          </a:p>
+          <a:p>
+            <a:endParaRPr lang="fr-FR" baseline="0" dirty="0" smtClean="0"/>
+          </a:p>
+          <a:p>
+            <a:r>
+              <a:rPr lang="fr-FR" baseline="0" dirty="0" smtClean="0"/>
+              <a:t>XXX et par contre il faudrait un exemple avec un test sur un objet vide, ce serait plus clair </a:t>
+            </a:r>
+          </a:p>
+          <a:p>
+            <a:r>
+              <a:rPr lang="fr-FR" baseline="0" dirty="0" err="1" smtClean="0"/>
+              <a:t>reponse</a:t>
+            </a:r>
+            <a:r>
+              <a:rPr lang="fr-FR" baseline="0" dirty="0" smtClean="0"/>
+              <a:t> = ‘’</a:t>
+            </a:r>
+          </a:p>
+          <a:p>
+            <a:r>
+              <a:rPr lang="fr-FR" baseline="0" dirty="0" smtClean="0"/>
+              <a:t>If </a:t>
+            </a:r>
+            <a:r>
+              <a:rPr lang="fr-FR" baseline="0" dirty="0" err="1" smtClean="0"/>
+              <a:t>reponse</a:t>
+            </a:r>
+            <a:r>
+              <a:rPr lang="fr-FR" baseline="0" dirty="0" smtClean="0"/>
+              <a:t>:</a:t>
+            </a:r>
+          </a:p>
+          <a:p>
+            <a:r>
+              <a:rPr lang="fr-FR" baseline="0" dirty="0" smtClean="0"/>
+              <a:t>   </a:t>
+            </a:r>
+            <a:r>
+              <a:rPr lang="fr-FR" baseline="0" dirty="0" err="1" smtClean="0"/>
+              <a:t>print</a:t>
+            </a:r>
+            <a:r>
+              <a:rPr lang="fr-FR" baseline="0" dirty="0" smtClean="0"/>
+              <a:t> ‘on ne passe pas par ici’ </a:t>
+            </a:r>
+          </a:p>
+          <a:p>
+            <a:r>
+              <a:rPr lang="fr-FR" baseline="0" dirty="0" err="1" smtClean="0"/>
+              <a:t>else</a:t>
+            </a:r>
+            <a:r>
+              <a:rPr lang="fr-FR" baseline="0" dirty="0" smtClean="0"/>
+              <a:t>:</a:t>
+            </a:r>
+          </a:p>
+          <a:p>
+            <a:r>
+              <a:rPr lang="fr-FR" baseline="0" dirty="0" smtClean="0"/>
+              <a:t>    </a:t>
+            </a:r>
+            <a:r>
+              <a:rPr lang="fr-FR" baseline="0" dirty="0" err="1" smtClean="0"/>
+              <a:t>print</a:t>
+            </a:r>
+            <a:r>
+              <a:rPr lang="fr-FR" baseline="0" dirty="0" smtClean="0"/>
+              <a:t> ‘mais on passe par la’</a:t>
+            </a:r>
+          </a:p>
+          <a:p>
+            <a:endParaRPr lang="fr-FR" baseline="0" dirty="0" smtClean="0"/>
           </a:p>
         </p:txBody>
       </p:sp>
@@ -1374,7 +1623,15 @@
             </a:r>
             <a:r>
               <a:rPr lang="fr-FR" baseline="0" dirty="0" smtClean="0"/>
-              <a:t> du if note &gt; 10 sont exécuté même si note &gt; 12</a:t>
+              <a:t> du if note &gt; 10 sont </a:t>
+            </a:r>
+            <a:r>
+              <a:rPr lang="fr-FR" baseline="0" dirty="0" smtClean="0"/>
+              <a:t>exécutés </a:t>
+            </a:r>
+            <a:r>
+              <a:rPr lang="fr-FR" baseline="0" dirty="0" smtClean="0"/>
+              <a:t>même si note &gt; 12</a:t>
             </a:r>
             <a:endParaRPr lang="fr-FR" dirty="0" smtClean="0"/>
           </a:p>
@@ -1697,7 +1954,7 @@
   <p:timing>
     <p:tnLst>
       <p:par>
-        <p:cTn id="1" dur="indefinite" restart="never" nodeType="tmRoot"/>
+        <p:cTn xmlns:p14="http://schemas.microsoft.com/office/powerpoint/2010/main" id="1" dur="indefinite" restart="never" nodeType="tmRoot"/>
       </p:par>
     </p:tnLst>
   </p:timing>
@@ -1857,7 +2114,7 @@
               <a:pPr>
                 <a:defRPr/>
               </a:pPr>
-              <a:t>‹N°›</a:t>
+              <a:t>‹#›</a:t>
             </a:fld>
             <a:endParaRPr lang="fr-FR"/>
           </a:p>
@@ -2039,7 +2296,7 @@
               <a:pPr>
                 <a:defRPr/>
               </a:pPr>
-              <a:t>‹N°›</a:t>
+              <a:t>‹#›</a:t>
             </a:fld>
             <a:endParaRPr lang="fr-FR"/>
           </a:p>
@@ -2278,7 +2535,7 @@
               <a:pPr>
                 <a:defRPr/>
               </a:pPr>
-              <a:t>‹N°›</a:t>
+              <a:t>‹#›</a:t>
             </a:fld>
             <a:endParaRPr lang="fr-FR"/>
           </a:p>
@@ -2450,7 +2707,7 @@
               <a:pPr>
                 <a:defRPr/>
               </a:pPr>
-              <a:t>‹N°›</a:t>
+              <a:t>‹#›</a:t>
             </a:fld>
             <a:endParaRPr lang="fr-FR"/>
           </a:p>
@@ -2469,7 +2726,7 @@
   <p:timing>
     <p:tnLst>
       <p:par>
-        <p:cTn id="1" dur="indefinite" restart="never" nodeType="tmRoot"/>
+        <p:cTn xmlns:p14="http://schemas.microsoft.com/office/powerpoint/2010/main" id="1" dur="indefinite" restart="never" nodeType="tmRoot"/>
       </p:par>
     </p:tnLst>
   </p:timing>
@@ -2651,7 +2908,7 @@
               <a:pPr>
                 <a:defRPr/>
               </a:pPr>
-              <a:t>‹N°›</a:t>
+              <a:t>‹#›</a:t>
             </a:fld>
             <a:endParaRPr lang="fr-FR"/>
           </a:p>
@@ -2670,7 +2927,7 @@
   <p:timing>
     <p:tnLst>
       <p:par>
-        <p:cTn id="1" dur="indefinite" restart="never" nodeType="tmRoot"/>
+        <p:cTn xmlns:p14="http://schemas.microsoft.com/office/powerpoint/2010/main" id="1" dur="indefinite" restart="never" nodeType="tmRoot"/>
       </p:par>
     </p:tnLst>
   </p:timing>
@@ -2948,7 +3205,7 @@
               <a:pPr>
                 <a:defRPr/>
               </a:pPr>
-              <a:t>‹N°›</a:t>
+              <a:t>‹#›</a:t>
             </a:fld>
             <a:endParaRPr lang="fr-FR"/>
           </a:p>
@@ -2967,7 +3224,7 @@
   <p:timing>
     <p:tnLst>
       <p:par>
-        <p:cTn id="1" dur="indefinite" restart="never" nodeType="tmRoot"/>
+        <p:cTn xmlns:p14="http://schemas.microsoft.com/office/powerpoint/2010/main" id="1" dur="indefinite" restart="never" nodeType="tmRoot"/>
       </p:par>
     </p:tnLst>
   </p:timing>
@@ -3379,7 +3636,7 @@
               <a:pPr>
                 <a:defRPr/>
               </a:pPr>
-              <a:t>‹N°›</a:t>
+              <a:t>‹#›</a:t>
             </a:fld>
             <a:endParaRPr lang="fr-FR"/>
           </a:p>
@@ -3398,7 +3655,7 @@
   <p:timing>
     <p:tnLst>
       <p:par>
-        <p:cTn id="1" dur="indefinite" restart="never" nodeType="tmRoot"/>
+        <p:cTn xmlns:p14="http://schemas.microsoft.com/office/powerpoint/2010/main" id="1" dur="indefinite" restart="never" nodeType="tmRoot"/>
       </p:par>
     </p:tnLst>
   </p:timing>
@@ -3506,7 +3763,7 @@
               <a:pPr>
                 <a:defRPr/>
               </a:pPr>
-              <a:t>‹N°›</a:t>
+              <a:t>‹#›</a:t>
             </a:fld>
             <a:endParaRPr lang="fr-FR"/>
           </a:p>
@@ -3525,7 +3782,7 @@
   <p:timing>
     <p:tnLst>
       <p:par>
-        <p:cTn id="1" dur="indefinite" restart="never" nodeType="tmRoot"/>
+        <p:cTn xmlns:p14="http://schemas.microsoft.com/office/powerpoint/2010/main" id="1" dur="indefinite" restart="never" nodeType="tmRoot"/>
       </p:par>
     </p:tnLst>
   </p:timing>
@@ -3610,7 +3867,7 @@
               <a:pPr>
                 <a:defRPr/>
               </a:pPr>
-              <a:t>‹N°›</a:t>
+              <a:t>‹#›</a:t>
             </a:fld>
             <a:endParaRPr lang="fr-FR"/>
           </a:p>
@@ -3629,7 +3886,7 @@
   <p:timing>
     <p:tnLst>
       <p:par>
-        <p:cTn id="1" dur="indefinite" restart="never" nodeType="tmRoot"/>
+        <p:cTn xmlns:p14="http://schemas.microsoft.com/office/powerpoint/2010/main" id="1" dur="indefinite" restart="never" nodeType="tmRoot"/>
       </p:par>
     </p:tnLst>
   </p:timing>
@@ -3896,7 +4153,7 @@
               <a:pPr>
                 <a:defRPr/>
               </a:pPr>
-              <a:t>‹N°›</a:t>
+              <a:t>‹#›</a:t>
             </a:fld>
             <a:endParaRPr lang="fr-FR"/>
           </a:p>
@@ -4152,7 +4409,7 @@
               <a:pPr>
                 <a:defRPr/>
               </a:pPr>
-              <a:t>‹N°›</a:t>
+              <a:t>‹#›</a:t>
             </a:fld>
             <a:endParaRPr lang="fr-FR"/>
           </a:p>
@@ -4220,14 +4477,14 @@
           </a:ln>
           <a:extLst>
             <a:ext uri="{909E8E84-426E-40dd-AFC4-6F175D3DCCD1}">
-              <a14:hiddenFill xmlns:a14="http://schemas.microsoft.com/office/drawing/2010/main" xmlns="">
+              <a14:hiddenFill xmlns:a14="http://schemas.microsoft.com/office/drawing/2010/main">
                 <a:solidFill>
                   <a:srgbClr val="FFFFFF"/>
                 </a:solidFill>
               </a14:hiddenFill>
             </a:ext>
             <a:ext uri="{91240B29-F687-4f45-9708-019B960494DF}">
-              <a14:hiddenLine xmlns:a14="http://schemas.microsoft.com/office/drawing/2010/main" xmlns="" w="9525">
+              <a14:hiddenLine xmlns:a14="http://schemas.microsoft.com/office/drawing/2010/main" w="9525">
                 <a:solidFill>
                   <a:srgbClr val="000000"/>
                 </a:solidFill>
@@ -4278,14 +4535,14 @@
           </a:ln>
           <a:extLst>
             <a:ext uri="{909E8E84-426E-40dd-AFC4-6F175D3DCCD1}">
-              <a14:hiddenFill xmlns:a14="http://schemas.microsoft.com/office/drawing/2010/main" xmlns="">
+              <a14:hiddenFill xmlns:a14="http://schemas.microsoft.com/office/drawing/2010/main">
                 <a:solidFill>
                   <a:srgbClr val="FFFFFF"/>
                 </a:solidFill>
               </a14:hiddenFill>
             </a:ext>
             <a:ext uri="{91240B29-F687-4f45-9708-019B960494DF}">
-              <a14:hiddenLine xmlns:a14="http://schemas.microsoft.com/office/drawing/2010/main" xmlns="" w="9525">
+              <a14:hiddenLine xmlns:a14="http://schemas.microsoft.com/office/drawing/2010/main" w="9525">
                 <a:solidFill>
                   <a:srgbClr val="000000"/>
                 </a:solidFill>
@@ -4455,7 +4712,7 @@
               <a:pPr>
                 <a:defRPr/>
               </a:pPr>
-              <a:t>‹N°›</a:t>
+              <a:t>‹#›</a:t>
             </a:fld>
             <a:endParaRPr lang="fr-FR" dirty="0"/>
           </a:p>
@@ -4481,7 +4738,7 @@
   <p:timing>
     <p:tnLst>
       <p:par>
-        <p:cTn id="1" dur="indefinite" restart="never" nodeType="tmRoot"/>
+        <p:cTn xmlns:p14="http://schemas.microsoft.com/office/powerpoint/2010/main" id="1" dur="indefinite" restart="never" nodeType="tmRoot"/>
       </p:par>
     </p:tnLst>
   </p:timing>
@@ -5172,7 +5429,7 @@
   <p:timing>
     <p:tnLst>
       <p:par>
-        <p:cTn id="1" dur="indefinite" restart="never" nodeType="tmRoot">
+        <p:cTn xmlns:p14="http://schemas.microsoft.com/office/powerpoint/2010/main" id="1" dur="indefinite" restart="never" nodeType="tmRoot">
           <p:childTnLst>
             <p:seq concurrent="1" nextAc="seek">
               <p:cTn id="2" dur="indefinite" nodeType="mainSeq">
@@ -5771,7 +6028,15 @@
             </a:r>
             <a:r>
               <a:rPr lang="fr-FR" sz="3200" dirty="0"/>
-              <a:t>objets vide ([], (), {}, set([]), </a:t>
+              <a:t>objets </a:t>
+            </a:r>
+            <a:r>
+              <a:rPr lang="fr-FR" sz="3200" dirty="0" smtClean="0"/>
+              <a:t>vides </a:t>
+            </a:r>
+            <a:r>
+              <a:rPr lang="fr-FR" sz="3200" dirty="0"/>
+              <a:t>([], (), {}, set([]), </a:t>
             </a:r>
             <a:r>
               <a:rPr lang="fr-FR" sz="3200" dirty="0" smtClean="0"/>
@@ -5829,7 +6094,7 @@
   <p:timing>
     <p:tnLst>
       <p:par>
-        <p:cTn id="1" dur="indefinite" restart="never" nodeType="tmRoot">
+        <p:cTn xmlns:p14="http://schemas.microsoft.com/office/powerpoint/2010/main" id="1" dur="indefinite" restart="never" nodeType="tmRoot">
           <p:childTnLst>
             <p:seq concurrent="1" nextAc="seek">
               <p:cTn id="2" dur="indefinite" nodeType="mainSeq">
@@ -6869,7 +7134,7 @@
   <p:timing>
     <p:tnLst>
       <p:par>
-        <p:cTn id="1" dur="indefinite" restart="never" nodeType="tmRoot">
+        <p:cTn xmlns:p14="http://schemas.microsoft.com/office/powerpoint/2010/main" id="1" dur="indefinite" restart="never" nodeType="tmRoot">
           <p:childTnLst>
             <p:seq concurrent="1" nextAc="seek">
               <p:cTn id="2" dur="indefinite" nodeType="mainSeq">
@@ -7804,7 +8069,7 @@
   <p:timing>
     <p:tnLst>
       <p:par>
-        <p:cTn id="1" dur="indefinite" restart="never" nodeType="tmRoot">
+        <p:cTn xmlns:p14="http://schemas.microsoft.com/office/powerpoint/2010/main" id="1" dur="indefinite" restart="never" nodeType="tmRoot">
           <p:childTnLst>
             <p:seq concurrent="1" nextAc="seek">
               <p:cTn id="2" dur="indefinite" nodeType="mainSeq">
@@ -8742,7 +9007,7 @@
   <p:timing>
     <p:tnLst>
       <p:par>
-        <p:cTn id="1" dur="indefinite" restart="never" nodeType="tmRoot">
+        <p:cTn xmlns:p14="http://schemas.microsoft.com/office/powerpoint/2010/main" id="1" dur="indefinite" restart="never" nodeType="tmRoot">
           <p:childTnLst>
             <p:seq concurrent="1" nextAc="seek">
               <p:cTn id="2" dur="indefinite" nodeType="mainSeq">

</xml_diff>